<commit_message>
X11 haven't done yet, nor position
</commit_message>
<xml_diff>
--- a/修圖.pptx
+++ b/修圖.pptx
@@ -105,6 +105,11 @@
       </a:defRPr>
     </a:lvl9pPr>
   </p:defaultTextStyle>
+  <p:extLst>
+    <p:ext uri="{EFAFB233-063F-42B5-8137-9DF3F51BA10A}">
+      <p15:sldGuideLst xmlns:p15="http://schemas.microsoft.com/office/powerpoint/2012/main"/>
+    </p:ext>
+  </p:extLst>
 </p:presentation>
 </file>
 
@@ -239,7 +244,7 @@
           <a:p>
             <a:fld id="{EE8FF14D-E2FE-4185-9579-CEC860A67782}" type="datetimeFigureOut">
               <a:rPr lang="zh-TW" altLang="en-US" smtClean="0"/>
-              <a:t>2024/12/20</a:t>
+              <a:t>2024/12/21</a:t>
             </a:fld>
             <a:endParaRPr lang="zh-TW" altLang="en-US"/>
           </a:p>
@@ -409,7 +414,7 @@
           <a:p>
             <a:fld id="{EE8FF14D-E2FE-4185-9579-CEC860A67782}" type="datetimeFigureOut">
               <a:rPr lang="zh-TW" altLang="en-US" smtClean="0"/>
-              <a:t>2024/12/20</a:t>
+              <a:t>2024/12/21</a:t>
             </a:fld>
             <a:endParaRPr lang="zh-TW" altLang="en-US"/>
           </a:p>
@@ -589,7 +594,7 @@
           <a:p>
             <a:fld id="{EE8FF14D-E2FE-4185-9579-CEC860A67782}" type="datetimeFigureOut">
               <a:rPr lang="zh-TW" altLang="en-US" smtClean="0"/>
-              <a:t>2024/12/20</a:t>
+              <a:t>2024/12/21</a:t>
             </a:fld>
             <a:endParaRPr lang="zh-TW" altLang="en-US"/>
           </a:p>
@@ -759,7 +764,7 @@
           <a:p>
             <a:fld id="{EE8FF14D-E2FE-4185-9579-CEC860A67782}" type="datetimeFigureOut">
               <a:rPr lang="zh-TW" altLang="en-US" smtClean="0"/>
-              <a:t>2024/12/20</a:t>
+              <a:t>2024/12/21</a:t>
             </a:fld>
             <a:endParaRPr lang="zh-TW" altLang="en-US"/>
           </a:p>
@@ -1003,7 +1008,7 @@
           <a:p>
             <a:fld id="{EE8FF14D-E2FE-4185-9579-CEC860A67782}" type="datetimeFigureOut">
               <a:rPr lang="zh-TW" altLang="en-US" smtClean="0"/>
-              <a:t>2024/12/20</a:t>
+              <a:t>2024/12/21</a:t>
             </a:fld>
             <a:endParaRPr lang="zh-TW" altLang="en-US"/>
           </a:p>
@@ -1235,7 +1240,7 @@
           <a:p>
             <a:fld id="{EE8FF14D-E2FE-4185-9579-CEC860A67782}" type="datetimeFigureOut">
               <a:rPr lang="zh-TW" altLang="en-US" smtClean="0"/>
-              <a:t>2024/12/20</a:t>
+              <a:t>2024/12/21</a:t>
             </a:fld>
             <a:endParaRPr lang="zh-TW" altLang="en-US"/>
           </a:p>
@@ -1602,7 +1607,7 @@
           <a:p>
             <a:fld id="{EE8FF14D-E2FE-4185-9579-CEC860A67782}" type="datetimeFigureOut">
               <a:rPr lang="zh-TW" altLang="en-US" smtClean="0"/>
-              <a:t>2024/12/20</a:t>
+              <a:t>2024/12/21</a:t>
             </a:fld>
             <a:endParaRPr lang="zh-TW" altLang="en-US"/>
           </a:p>
@@ -1720,7 +1725,7 @@
           <a:p>
             <a:fld id="{EE8FF14D-E2FE-4185-9579-CEC860A67782}" type="datetimeFigureOut">
               <a:rPr lang="zh-TW" altLang="en-US" smtClean="0"/>
-              <a:t>2024/12/20</a:t>
+              <a:t>2024/12/21</a:t>
             </a:fld>
             <a:endParaRPr lang="zh-TW" altLang="en-US"/>
           </a:p>
@@ -1815,7 +1820,7 @@
           <a:p>
             <a:fld id="{EE8FF14D-E2FE-4185-9579-CEC860A67782}" type="datetimeFigureOut">
               <a:rPr lang="zh-TW" altLang="en-US" smtClean="0"/>
-              <a:t>2024/12/20</a:t>
+              <a:t>2024/12/21</a:t>
             </a:fld>
             <a:endParaRPr lang="zh-TW" altLang="en-US"/>
           </a:p>
@@ -2092,7 +2097,7 @@
           <a:p>
             <a:fld id="{EE8FF14D-E2FE-4185-9579-CEC860A67782}" type="datetimeFigureOut">
               <a:rPr lang="zh-TW" altLang="en-US" smtClean="0"/>
-              <a:t>2024/12/20</a:t>
+              <a:t>2024/12/21</a:t>
             </a:fld>
             <a:endParaRPr lang="zh-TW" altLang="en-US"/>
           </a:p>
@@ -2349,7 +2354,7 @@
           <a:p>
             <a:fld id="{EE8FF14D-E2FE-4185-9579-CEC860A67782}" type="datetimeFigureOut">
               <a:rPr lang="zh-TW" altLang="en-US" smtClean="0"/>
-              <a:t>2024/12/20</a:t>
+              <a:t>2024/12/21</a:t>
             </a:fld>
             <a:endParaRPr lang="zh-TW" altLang="en-US"/>
           </a:p>
@@ -2562,7 +2567,7 @@
           <a:p>
             <a:fld id="{EE8FF14D-E2FE-4185-9579-CEC860A67782}" type="datetimeFigureOut">
               <a:rPr lang="zh-TW" altLang="en-US" smtClean="0"/>
-              <a:t>2024/12/20</a:t>
+              <a:t>2024/12/21</a:t>
             </a:fld>
             <a:endParaRPr lang="zh-TW" altLang="en-US"/>
           </a:p>
@@ -4309,6 +4314,1150 @@
           </p:pic>
         </p:grpSp>
       </p:grpSp>
+      <p:pic>
+        <p:nvPicPr>
+          <p:cNvPr id="4" name="圖片 3">
+            <a:extLst>
+              <a:ext uri="{FF2B5EF4-FFF2-40B4-BE49-F238E27FC236}">
+                <a16:creationId xmlns:a16="http://schemas.microsoft.com/office/drawing/2014/main" id="{611A8DB5-B771-7A9A-BF7A-54D5960DA983}"/>
+              </a:ext>
+            </a:extLst>
+          </p:cNvPr>
+          <p:cNvPicPr>
+            <a:picLocks noChangeAspect="1"/>
+          </p:cNvPicPr>
+          <p:nvPr/>
+        </p:nvPicPr>
+        <p:blipFill>
+          <a:blip r:embed="rId15">
+            <a:extLst>
+              <a:ext uri="{28A0092B-C50C-407E-A947-70E740481C1C}">
+                <a14:useLocalDpi xmlns:a14="http://schemas.microsoft.com/office/drawing/2010/main" val="0"/>
+              </a:ext>
+            </a:extLst>
+          </a:blip>
+          <a:stretch>
+            <a:fillRect/>
+          </a:stretch>
+        </p:blipFill>
+        <p:spPr>
+          <a:xfrm>
+            <a:off x="12547600" y="12557644"/>
+            <a:ext cx="12192000" cy="5664200"/>
+          </a:xfrm>
+          <a:prstGeom prst="rect">
+            <a:avLst/>
+          </a:prstGeom>
+        </p:spPr>
+      </p:pic>
+      <p:pic>
+        <p:nvPicPr>
+          <p:cNvPr id="32" name="圖片 31">
+            <a:extLst>
+              <a:ext uri="{FF2B5EF4-FFF2-40B4-BE49-F238E27FC236}">
+                <a16:creationId xmlns:a16="http://schemas.microsoft.com/office/drawing/2014/main" id="{95A0900D-F54B-B4F1-A005-21F18F8AADDC}"/>
+              </a:ext>
+            </a:extLst>
+          </p:cNvPr>
+          <p:cNvPicPr>
+            <a:picLocks noChangeAspect="1"/>
+          </p:cNvPicPr>
+          <p:nvPr/>
+        </p:nvPicPr>
+        <p:blipFill>
+          <a:blip r:embed="rId15">
+            <a:extLst>
+              <a:ext uri="{28A0092B-C50C-407E-A947-70E740481C1C}">
+                <a14:useLocalDpi xmlns:a14="http://schemas.microsoft.com/office/drawing/2010/main" val="0"/>
+              </a:ext>
+            </a:extLst>
+          </a:blip>
+          <a:stretch>
+            <a:fillRect/>
+          </a:stretch>
+        </p:blipFill>
+        <p:spPr>
+          <a:xfrm>
+            <a:off x="12547600" y="18936832"/>
+            <a:ext cx="12192000" cy="5664200"/>
+          </a:xfrm>
+          <a:prstGeom prst="rect">
+            <a:avLst/>
+          </a:prstGeom>
+        </p:spPr>
+      </p:pic>
+      <p:grpSp>
+        <p:nvGrpSpPr>
+          <p:cNvPr id="45" name="群組 44">
+            <a:extLst>
+              <a:ext uri="{FF2B5EF4-FFF2-40B4-BE49-F238E27FC236}">
+                <a16:creationId xmlns:a16="http://schemas.microsoft.com/office/drawing/2014/main" id="{92CC5C34-3810-42E8-2E03-0509AFB127DD}"/>
+              </a:ext>
+            </a:extLst>
+          </p:cNvPr>
+          <p:cNvGrpSpPr/>
+          <p:nvPr/>
+        </p:nvGrpSpPr>
+        <p:grpSpPr>
+          <a:xfrm>
+            <a:off x="-9150674" y="22956091"/>
+            <a:ext cx="6340703" cy="4434840"/>
+            <a:chOff x="40218" y="22982009"/>
+            <a:chExt cx="6340703" cy="4434840"/>
+          </a:xfrm>
+        </p:grpSpPr>
+        <p:pic>
+          <p:nvPicPr>
+            <p:cNvPr id="2" name="圖片 1">
+              <a:extLst>
+                <a:ext uri="{FF2B5EF4-FFF2-40B4-BE49-F238E27FC236}">
+                  <a16:creationId xmlns:a16="http://schemas.microsoft.com/office/drawing/2014/main" id="{8E70FA7A-76DE-CB61-919D-E01888DEF092}"/>
+                </a:ext>
+              </a:extLst>
+            </p:cNvPr>
+            <p:cNvPicPr>
+              <a:picLocks noChangeAspect="1"/>
+            </p:cNvPicPr>
+            <p:nvPr/>
+          </p:nvPicPr>
+          <p:blipFill>
+            <a:blip r:embed="rId4">
+              <a:extLst>
+                <a:ext uri="{BEBA8EAE-BF5A-486C-A8C5-ECC9F3942E4B}">
+                  <a14:imgProps xmlns:a14="http://schemas.microsoft.com/office/drawing/2010/main">
+                    <a14:imgLayer r:embed="rId5">
+                      <a14:imgEffect>
+                        <a14:backgroundRemoval t="3952" b="95533" l="2750" r="32438">
+                          <a14:foregroundMark x1="5063" y1="11512" x2="5063" y2="11512"/>
+                          <a14:foregroundMark x1="5063" y1="11512" x2="6375" y2="73883"/>
+                          <a14:foregroundMark x1="3750" y1="24570" x2="4313" y2="71478"/>
+                          <a14:foregroundMark x1="4313" y1="71478" x2="9063" y2="85395"/>
+                          <a14:foregroundMark x1="9063" y1="85395" x2="16875" y2="84021"/>
+                          <a14:foregroundMark x1="16875" y1="84021" x2="23313" y2="86254"/>
+                          <a14:foregroundMark x1="23313" y1="86254" x2="27250" y2="79553"/>
+                          <a14:foregroundMark x1="27250" y1="79553" x2="28625" y2="66838"/>
+                          <a14:foregroundMark x1="28625" y1="66838" x2="28875" y2="26804"/>
+                          <a14:foregroundMark x1="28875" y1="26804" x2="21625" y2="13746"/>
+                          <a14:foregroundMark x1="21625" y1="13746" x2="6000" y2="14777"/>
+                          <a14:foregroundMark x1="18563" y1="13058" x2="28313" y2="10653"/>
+                          <a14:foregroundMark x1="28313" y1="10653" x2="30188" y2="23540"/>
+                          <a14:foregroundMark x1="30188" y1="23540" x2="30188" y2="23540"/>
+                          <a14:foregroundMark x1="27500" y1="8763" x2="27500" y2="8763"/>
+                          <a14:foregroundMark x1="29063" y1="8247" x2="29063" y2="8247"/>
+                          <a14:foregroundMark x1="31250" y1="13746" x2="31250" y2="13746"/>
+                          <a14:foregroundMark x1="31438" y1="25773" x2="31813" y2="61340"/>
+                          <a14:foregroundMark x1="29688" y1="94158" x2="21125" y2="90550"/>
+                          <a14:foregroundMark x1="21125" y1="90550" x2="12125" y2="93471"/>
+                          <a14:foregroundMark x1="12125" y1="93471" x2="3063" y2="93471"/>
+                          <a14:foregroundMark x1="3063" y1="93471" x2="3063" y2="93471"/>
+                          <a14:foregroundMark x1="2750" y1="70103" x2="3125" y2="3952"/>
+                          <a14:foregroundMark x1="4813" y1="7045" x2="12375" y2="6873"/>
+                          <a14:foregroundMark x1="12375" y1="6873" x2="12937" y2="6873"/>
+                          <a14:foregroundMark x1="32375" y1="13746" x2="32188" y2="19416"/>
+                          <a14:foregroundMark x1="32063" y1="30756" x2="32000" y2="41581"/>
+                          <a14:foregroundMark x1="32063" y1="56529" x2="32438" y2="69072"/>
+                          <a14:foregroundMark x1="32438" y1="69072" x2="32375" y2="69244"/>
+                          <a14:foregroundMark x1="31250" y1="89347" x2="31750" y2="81271"/>
+                          <a14:foregroundMark x1="31813" y1="83505" x2="31500" y2="91065"/>
+                          <a14:foregroundMark x1="32000" y1="84880" x2="30562" y2="95533"/>
+                        </a14:backgroundRemoval>
+                      </a14:imgEffect>
+                    </a14:imgLayer>
+                  </a14:imgProps>
+                </a:ext>
+                <a:ext uri="{28A0092B-C50C-407E-A947-70E740481C1C}">
+                  <a14:useLocalDpi xmlns:a14="http://schemas.microsoft.com/office/drawing/2010/main" val="0"/>
+                </a:ext>
+              </a:extLst>
+            </a:blip>
+            <a:srcRect r="65642"/>
+            <a:stretch/>
+          </p:blipFill>
+          <p:spPr>
+            <a:xfrm>
+              <a:off x="40218" y="22982009"/>
+              <a:ext cx="6340703" cy="4434840"/>
+            </a:xfrm>
+            <a:prstGeom prst="rect">
+              <a:avLst/>
+            </a:prstGeom>
+          </p:spPr>
+        </p:pic>
+        <p:pic>
+          <p:nvPicPr>
+            <p:cNvPr id="6" name="圖片 5">
+              <a:extLst>
+                <a:ext uri="{FF2B5EF4-FFF2-40B4-BE49-F238E27FC236}">
+                  <a16:creationId xmlns:a16="http://schemas.microsoft.com/office/drawing/2014/main" id="{943DDE8C-1331-4959-7D74-AB27968F8C8B}"/>
+                </a:ext>
+              </a:extLst>
+            </p:cNvPr>
+            <p:cNvPicPr>
+              <a:picLocks noChangeAspect="1"/>
+            </p:cNvPicPr>
+            <p:nvPr/>
+          </p:nvPicPr>
+          <p:blipFill>
+            <a:blip r:embed="rId16">
+              <a:extLst>
+                <a:ext uri="{BEBA8EAE-BF5A-486C-A8C5-ECC9F3942E4B}">
+                  <a14:imgProps xmlns:a14="http://schemas.microsoft.com/office/drawing/2010/main">
+                    <a14:imgLayer r:embed="rId11">
+                      <a14:imgEffect>
+                        <a14:backgroundRemoval t="53812" b="69731" l="66094" r="74427">
+                          <a14:foregroundMark x1="67760" y1="66928" x2="67708" y2="64013"/>
+                          <a14:foregroundMark x1="66823" y1="65807" x2="66250" y2="67601"/>
+                          <a14:foregroundMark x1="66094" y1="57848" x2="67500" y2="54821"/>
+                        </a14:backgroundRemoval>
+                      </a14:imgEffect>
+                    </a14:imgLayer>
+                  </a14:imgProps>
+                </a:ext>
+                <a:ext uri="{28A0092B-C50C-407E-A947-70E740481C1C}">
+                  <a14:useLocalDpi xmlns:a14="http://schemas.microsoft.com/office/drawing/2010/main" val="0"/>
+                </a:ext>
+              </a:extLst>
+            </a:blip>
+            <a:srcRect l="65387" t="51803" r="24508" b="28064"/>
+            <a:stretch/>
+          </p:blipFill>
+          <p:spPr>
+            <a:xfrm>
+              <a:off x="2019162" y="24103746"/>
+              <a:ext cx="1074541" cy="994572"/>
+            </a:xfrm>
+            <a:prstGeom prst="rect">
+              <a:avLst/>
+            </a:prstGeom>
+          </p:spPr>
+        </p:pic>
+        <p:pic>
+          <p:nvPicPr>
+            <p:cNvPr id="8" name="圖片 7">
+              <a:extLst>
+                <a:ext uri="{FF2B5EF4-FFF2-40B4-BE49-F238E27FC236}">
+                  <a16:creationId xmlns:a16="http://schemas.microsoft.com/office/drawing/2014/main" id="{4735C304-A06D-740A-D05F-0A57D34D257C}"/>
+                </a:ext>
+              </a:extLst>
+            </p:cNvPr>
+            <p:cNvPicPr>
+              <a:picLocks noChangeAspect="1"/>
+            </p:cNvPicPr>
+            <p:nvPr/>
+          </p:nvPicPr>
+          <p:blipFill>
+            <a:blip r:embed="rId12">
+              <a:extLst>
+                <a:ext uri="{BEBA8EAE-BF5A-486C-A8C5-ECC9F3942E4B}">
+                  <a14:imgProps xmlns:a14="http://schemas.microsoft.com/office/drawing/2010/main">
+                    <a14:imgLayer r:embed="rId11">
+                      <a14:imgEffect>
+                        <a14:backgroundRemoval t="77524" b="95870" l="12329" r="17005"/>
+                      </a14:imgEffect>
+                    </a14:imgLayer>
+                  </a14:imgProps>
+                </a:ext>
+                <a:ext uri="{28A0092B-C50C-407E-A947-70E740481C1C}">
+                  <a14:useLocalDpi xmlns:a14="http://schemas.microsoft.com/office/drawing/2010/main" val="0"/>
+                </a:ext>
+              </a:extLst>
+            </a:blip>
+            <a:srcRect l="11744" t="75231" r="82411" b="1837"/>
+            <a:stretch/>
+          </p:blipFill>
+          <p:spPr>
+            <a:xfrm>
+              <a:off x="3613406" y="23978377"/>
+              <a:ext cx="545715" cy="1241727"/>
+            </a:xfrm>
+            <a:prstGeom prst="rect">
+              <a:avLst/>
+            </a:prstGeom>
+          </p:spPr>
+        </p:pic>
+        <p:pic>
+          <p:nvPicPr>
+            <p:cNvPr id="31" name="圖片 30">
+              <a:extLst>
+                <a:ext uri="{FF2B5EF4-FFF2-40B4-BE49-F238E27FC236}">
+                  <a16:creationId xmlns:a16="http://schemas.microsoft.com/office/drawing/2014/main" id="{AF5DEC42-D539-B521-7791-9D9F6E77107C}"/>
+                </a:ext>
+              </a:extLst>
+            </p:cNvPr>
+            <p:cNvPicPr>
+              <a:picLocks noChangeAspect="1"/>
+            </p:cNvPicPr>
+            <p:nvPr/>
+          </p:nvPicPr>
+          <p:blipFill>
+            <a:blip r:embed="rId17">
+              <a:extLst>
+                <a:ext uri="{28A0092B-C50C-407E-A947-70E740481C1C}">
+                  <a14:useLocalDpi xmlns:a14="http://schemas.microsoft.com/office/drawing/2010/main" val="0"/>
+                </a:ext>
+              </a:extLst>
+            </a:blip>
+            <a:stretch>
+              <a:fillRect/>
+            </a:stretch>
+          </p:blipFill>
+          <p:spPr>
+            <a:xfrm>
+              <a:off x="3592460" y="24886494"/>
+              <a:ext cx="1606364" cy="1606364"/>
+            </a:xfrm>
+            <a:prstGeom prst="rect">
+              <a:avLst/>
+            </a:prstGeom>
+          </p:spPr>
+        </p:pic>
+        <p:pic>
+          <p:nvPicPr>
+            <p:cNvPr id="33" name="圖片 32">
+              <a:extLst>
+                <a:ext uri="{FF2B5EF4-FFF2-40B4-BE49-F238E27FC236}">
+                  <a16:creationId xmlns:a16="http://schemas.microsoft.com/office/drawing/2014/main" id="{0833A01A-79FA-0CDF-7C70-BE7482C4D627}"/>
+                </a:ext>
+              </a:extLst>
+            </p:cNvPr>
+            <p:cNvPicPr>
+              <a:picLocks noChangeAspect="1"/>
+            </p:cNvPicPr>
+            <p:nvPr/>
+          </p:nvPicPr>
+          <p:blipFill>
+            <a:blip r:embed="rId12">
+              <a:extLst>
+                <a:ext uri="{BEBA8EAE-BF5A-486C-A8C5-ECC9F3942E4B}">
+                  <a14:imgProps xmlns:a14="http://schemas.microsoft.com/office/drawing/2010/main">
+                    <a14:imgLayer r:embed="rId11">
+                      <a14:imgEffect>
+                        <a14:backgroundRemoval t="77524" b="95870" l="12329" r="17005"/>
+                      </a14:imgEffect>
+                    </a14:imgLayer>
+                  </a14:imgProps>
+                </a:ext>
+                <a:ext uri="{28A0092B-C50C-407E-A947-70E740481C1C}">
+                  <a14:useLocalDpi xmlns:a14="http://schemas.microsoft.com/office/drawing/2010/main" val="0"/>
+                </a:ext>
+              </a:extLst>
+            </a:blip>
+            <a:srcRect l="11744" t="75231" r="82411" b="1837"/>
+            <a:stretch/>
+          </p:blipFill>
+          <p:spPr>
+            <a:xfrm>
+              <a:off x="1754327" y="25180550"/>
+              <a:ext cx="545715" cy="994572"/>
+            </a:xfrm>
+            <a:prstGeom prst="rect">
+              <a:avLst/>
+            </a:prstGeom>
+          </p:spPr>
+        </p:pic>
+        <p:pic>
+          <p:nvPicPr>
+            <p:cNvPr id="34" name="圖片 33">
+              <a:extLst>
+                <a:ext uri="{FF2B5EF4-FFF2-40B4-BE49-F238E27FC236}">
+                  <a16:creationId xmlns:a16="http://schemas.microsoft.com/office/drawing/2014/main" id="{21372C2B-275A-5072-8232-0AC1F6DE5E50}"/>
+                </a:ext>
+              </a:extLst>
+            </p:cNvPr>
+            <p:cNvPicPr>
+              <a:picLocks noChangeAspect="1"/>
+            </p:cNvPicPr>
+            <p:nvPr/>
+          </p:nvPicPr>
+          <p:blipFill>
+            <a:blip r:embed="rId10">
+              <a:extLst>
+                <a:ext uri="{BEBA8EAE-BF5A-486C-A8C5-ECC9F3942E4B}">
+                  <a14:imgProps xmlns:a14="http://schemas.microsoft.com/office/drawing/2010/main">
+                    <a14:imgLayer r:embed="rId11">
+                      <a14:imgEffect>
+                        <a14:backgroundRemoval t="78427" b="95754" l="2609" r="10982"/>
+                      </a14:imgEffect>
+                    </a14:imgLayer>
+                  </a14:imgProps>
+                </a:ext>
+                <a:ext uri="{28A0092B-C50C-407E-A947-70E740481C1C}">
+                  <a14:useLocalDpi xmlns:a14="http://schemas.microsoft.com/office/drawing/2010/main" val="0"/>
+                </a:ext>
+              </a:extLst>
+            </a:blip>
+            <a:srcRect l="1562" t="76261" r="87971" b="2080"/>
+            <a:stretch/>
+          </p:blipFill>
+          <p:spPr>
+            <a:xfrm>
+              <a:off x="2362790" y="25180550"/>
+              <a:ext cx="709967" cy="994572"/>
+            </a:xfrm>
+            <a:prstGeom prst="rect">
+              <a:avLst/>
+            </a:prstGeom>
+          </p:spPr>
+        </p:pic>
+        <p:pic>
+          <p:nvPicPr>
+            <p:cNvPr id="35" name="圖片 34">
+              <a:extLst>
+                <a:ext uri="{FF2B5EF4-FFF2-40B4-BE49-F238E27FC236}">
+                  <a16:creationId xmlns:a16="http://schemas.microsoft.com/office/drawing/2014/main" id="{1EC1761F-A29E-0869-EB07-19BBCFCCBC4E}"/>
+                </a:ext>
+              </a:extLst>
+            </p:cNvPr>
+            <p:cNvPicPr>
+              <a:picLocks noChangeAspect="1"/>
+            </p:cNvPicPr>
+            <p:nvPr/>
+          </p:nvPicPr>
+          <p:blipFill>
+            <a:blip r:embed="rId10">
+              <a:extLst>
+                <a:ext uri="{BEBA8EAE-BF5A-486C-A8C5-ECC9F3942E4B}">
+                  <a14:imgProps xmlns:a14="http://schemas.microsoft.com/office/drawing/2010/main">
+                    <a14:imgLayer r:embed="rId11">
+                      <a14:imgEffect>
+                        <a14:backgroundRemoval t="78427" b="95754" l="2609" r="10982"/>
+                      </a14:imgEffect>
+                    </a14:imgLayer>
+                  </a14:imgProps>
+                </a:ext>
+                <a:ext uri="{28A0092B-C50C-407E-A947-70E740481C1C}">
+                  <a14:useLocalDpi xmlns:a14="http://schemas.microsoft.com/office/drawing/2010/main" val="0"/>
+                </a:ext>
+              </a:extLst>
+            </a:blip>
+            <a:srcRect l="1562" t="76261" r="87971" b="2080"/>
+            <a:stretch/>
+          </p:blipFill>
+          <p:spPr>
+            <a:xfrm>
+              <a:off x="3135505" y="25180550"/>
+              <a:ext cx="709967" cy="994572"/>
+            </a:xfrm>
+            <a:prstGeom prst="rect">
+              <a:avLst/>
+            </a:prstGeom>
+          </p:spPr>
+        </p:pic>
+      </p:grpSp>
+      <p:grpSp>
+        <p:nvGrpSpPr>
+          <p:cNvPr id="46" name="群組 45">
+            <a:extLst>
+              <a:ext uri="{FF2B5EF4-FFF2-40B4-BE49-F238E27FC236}">
+                <a16:creationId xmlns:a16="http://schemas.microsoft.com/office/drawing/2014/main" id="{C42D7B31-E8C4-E09A-8CC5-147D3E6A27A8}"/>
+              </a:ext>
+            </a:extLst>
+          </p:cNvPr>
+          <p:cNvGrpSpPr/>
+          <p:nvPr/>
+        </p:nvGrpSpPr>
+        <p:grpSpPr>
+          <a:xfrm>
+            <a:off x="-2185989" y="23098521"/>
+            <a:ext cx="6340703" cy="4434840"/>
+            <a:chOff x="6293909" y="22963130"/>
+            <a:chExt cx="6340703" cy="4434840"/>
+          </a:xfrm>
+        </p:grpSpPr>
+        <p:pic>
+          <p:nvPicPr>
+            <p:cNvPr id="36" name="圖片 35">
+              <a:extLst>
+                <a:ext uri="{FF2B5EF4-FFF2-40B4-BE49-F238E27FC236}">
+                  <a16:creationId xmlns:a16="http://schemas.microsoft.com/office/drawing/2014/main" id="{1A2413B6-AF5D-452D-188A-569221377C56}"/>
+                </a:ext>
+              </a:extLst>
+            </p:cNvPr>
+            <p:cNvPicPr>
+              <a:picLocks noChangeAspect="1"/>
+            </p:cNvPicPr>
+            <p:nvPr/>
+          </p:nvPicPr>
+          <p:blipFill>
+            <a:blip r:embed="rId4">
+              <a:extLst>
+                <a:ext uri="{BEBA8EAE-BF5A-486C-A8C5-ECC9F3942E4B}">
+                  <a14:imgProps xmlns:a14="http://schemas.microsoft.com/office/drawing/2010/main">
+                    <a14:imgLayer r:embed="rId5">
+                      <a14:imgEffect>
+                        <a14:backgroundRemoval t="3952" b="95533" l="2750" r="32438">
+                          <a14:foregroundMark x1="5063" y1="11512" x2="5063" y2="11512"/>
+                          <a14:foregroundMark x1="5063" y1="11512" x2="6375" y2="73883"/>
+                          <a14:foregroundMark x1="3750" y1="24570" x2="4313" y2="71478"/>
+                          <a14:foregroundMark x1="4313" y1="71478" x2="9063" y2="85395"/>
+                          <a14:foregroundMark x1="9063" y1="85395" x2="16875" y2="84021"/>
+                          <a14:foregroundMark x1="16875" y1="84021" x2="23313" y2="86254"/>
+                          <a14:foregroundMark x1="23313" y1="86254" x2="27250" y2="79553"/>
+                          <a14:foregroundMark x1="27250" y1="79553" x2="28625" y2="66838"/>
+                          <a14:foregroundMark x1="28625" y1="66838" x2="28875" y2="26804"/>
+                          <a14:foregroundMark x1="28875" y1="26804" x2="21625" y2="13746"/>
+                          <a14:foregroundMark x1="21625" y1="13746" x2="6000" y2="14777"/>
+                          <a14:foregroundMark x1="18563" y1="13058" x2="28313" y2="10653"/>
+                          <a14:foregroundMark x1="28313" y1="10653" x2="30188" y2="23540"/>
+                          <a14:foregroundMark x1="30188" y1="23540" x2="30188" y2="23540"/>
+                          <a14:foregroundMark x1="27500" y1="8763" x2="27500" y2="8763"/>
+                          <a14:foregroundMark x1="29063" y1="8247" x2="29063" y2="8247"/>
+                          <a14:foregroundMark x1="31250" y1="13746" x2="31250" y2="13746"/>
+                          <a14:foregroundMark x1="31438" y1="25773" x2="31813" y2="61340"/>
+                          <a14:foregroundMark x1="29688" y1="94158" x2="21125" y2="90550"/>
+                          <a14:foregroundMark x1="21125" y1="90550" x2="12125" y2="93471"/>
+                          <a14:foregroundMark x1="12125" y1="93471" x2="3063" y2="93471"/>
+                          <a14:foregroundMark x1="3063" y1="93471" x2="3063" y2="93471"/>
+                          <a14:foregroundMark x1="2750" y1="70103" x2="3125" y2="3952"/>
+                          <a14:foregroundMark x1="4813" y1="7045" x2="12375" y2="6873"/>
+                          <a14:foregroundMark x1="12375" y1="6873" x2="12937" y2="6873"/>
+                          <a14:foregroundMark x1="32375" y1="13746" x2="32188" y2="19416"/>
+                          <a14:foregroundMark x1="32063" y1="30756" x2="32000" y2="41581"/>
+                          <a14:foregroundMark x1="32063" y1="56529" x2="32438" y2="69072"/>
+                          <a14:foregroundMark x1="32438" y1="69072" x2="32375" y2="69244"/>
+                          <a14:foregroundMark x1="31250" y1="89347" x2="31750" y2="81271"/>
+                          <a14:foregroundMark x1="31813" y1="83505" x2="31500" y2="91065"/>
+                          <a14:foregroundMark x1="32000" y1="84880" x2="30562" y2="95533"/>
+                        </a14:backgroundRemoval>
+                      </a14:imgEffect>
+                    </a14:imgLayer>
+                  </a14:imgProps>
+                </a:ext>
+                <a:ext uri="{28A0092B-C50C-407E-A947-70E740481C1C}">
+                  <a14:useLocalDpi xmlns:a14="http://schemas.microsoft.com/office/drawing/2010/main" val="0"/>
+                </a:ext>
+              </a:extLst>
+            </a:blip>
+            <a:srcRect r="65642"/>
+            <a:stretch/>
+          </p:blipFill>
+          <p:spPr>
+            <a:xfrm>
+              <a:off x="6293909" y="22963130"/>
+              <a:ext cx="6340703" cy="4434840"/>
+            </a:xfrm>
+            <a:prstGeom prst="rect">
+              <a:avLst/>
+            </a:prstGeom>
+          </p:spPr>
+        </p:pic>
+        <p:pic>
+          <p:nvPicPr>
+            <p:cNvPr id="37" name="圖片 36">
+              <a:extLst>
+                <a:ext uri="{FF2B5EF4-FFF2-40B4-BE49-F238E27FC236}">
+                  <a16:creationId xmlns:a16="http://schemas.microsoft.com/office/drawing/2014/main" id="{BFB16739-4F49-D795-F2C1-2F9E4D520121}"/>
+                </a:ext>
+              </a:extLst>
+            </p:cNvPr>
+            <p:cNvPicPr>
+              <a:picLocks noChangeAspect="1"/>
+            </p:cNvPicPr>
+            <p:nvPr/>
+          </p:nvPicPr>
+          <p:blipFill>
+            <a:blip r:embed="rId16">
+              <a:extLst>
+                <a:ext uri="{BEBA8EAE-BF5A-486C-A8C5-ECC9F3942E4B}">
+                  <a14:imgProps xmlns:a14="http://schemas.microsoft.com/office/drawing/2010/main">
+                    <a14:imgLayer r:embed="rId11">
+                      <a14:imgEffect>
+                        <a14:backgroundRemoval t="53812" b="69731" l="66094" r="74427">
+                          <a14:foregroundMark x1="67760" y1="66928" x2="67708" y2="64013"/>
+                          <a14:foregroundMark x1="66823" y1="65807" x2="66250" y2="67601"/>
+                          <a14:foregroundMark x1="66094" y1="57848" x2="67500" y2="54821"/>
+                        </a14:backgroundRemoval>
+                      </a14:imgEffect>
+                    </a14:imgLayer>
+                  </a14:imgProps>
+                </a:ext>
+                <a:ext uri="{28A0092B-C50C-407E-A947-70E740481C1C}">
+                  <a14:useLocalDpi xmlns:a14="http://schemas.microsoft.com/office/drawing/2010/main" val="0"/>
+                </a:ext>
+              </a:extLst>
+            </a:blip>
+            <a:srcRect l="65387" t="51803" r="24508" b="28064"/>
+            <a:stretch/>
+          </p:blipFill>
+          <p:spPr>
+            <a:xfrm>
+              <a:off x="8272853" y="24084867"/>
+              <a:ext cx="1074541" cy="994572"/>
+            </a:xfrm>
+            <a:prstGeom prst="rect">
+              <a:avLst/>
+            </a:prstGeom>
+          </p:spPr>
+        </p:pic>
+        <p:pic>
+          <p:nvPicPr>
+            <p:cNvPr id="38" name="圖片 37">
+              <a:extLst>
+                <a:ext uri="{FF2B5EF4-FFF2-40B4-BE49-F238E27FC236}">
+                  <a16:creationId xmlns:a16="http://schemas.microsoft.com/office/drawing/2014/main" id="{9364CEC7-0C84-2CA3-ED9F-C555B3BBEDBD}"/>
+                </a:ext>
+              </a:extLst>
+            </p:cNvPr>
+            <p:cNvPicPr>
+              <a:picLocks noChangeAspect="1"/>
+            </p:cNvPicPr>
+            <p:nvPr/>
+          </p:nvPicPr>
+          <p:blipFill>
+            <a:blip r:embed="rId12">
+              <a:extLst>
+                <a:ext uri="{BEBA8EAE-BF5A-486C-A8C5-ECC9F3942E4B}">
+                  <a14:imgProps xmlns:a14="http://schemas.microsoft.com/office/drawing/2010/main">
+                    <a14:imgLayer r:embed="rId11">
+                      <a14:imgEffect>
+                        <a14:backgroundRemoval t="77524" b="95870" l="12329" r="17005"/>
+                      </a14:imgEffect>
+                    </a14:imgLayer>
+                  </a14:imgProps>
+                </a:ext>
+                <a:ext uri="{28A0092B-C50C-407E-A947-70E740481C1C}">
+                  <a14:useLocalDpi xmlns:a14="http://schemas.microsoft.com/office/drawing/2010/main" val="0"/>
+                </a:ext>
+              </a:extLst>
+            </a:blip>
+            <a:srcRect l="11744" t="75231" r="82411" b="1837"/>
+            <a:stretch/>
+          </p:blipFill>
+          <p:spPr>
+            <a:xfrm>
+              <a:off x="9459729" y="23961289"/>
+              <a:ext cx="545715" cy="1241727"/>
+            </a:xfrm>
+            <a:prstGeom prst="rect">
+              <a:avLst/>
+            </a:prstGeom>
+          </p:spPr>
+        </p:pic>
+        <p:pic>
+          <p:nvPicPr>
+            <p:cNvPr id="39" name="圖片 38">
+              <a:extLst>
+                <a:ext uri="{FF2B5EF4-FFF2-40B4-BE49-F238E27FC236}">
+                  <a16:creationId xmlns:a16="http://schemas.microsoft.com/office/drawing/2014/main" id="{9BBEDAF5-73C8-32EB-C2AA-CA1473670ECC}"/>
+                </a:ext>
+              </a:extLst>
+            </p:cNvPr>
+            <p:cNvPicPr>
+              <a:picLocks noChangeAspect="1"/>
+            </p:cNvPicPr>
+            <p:nvPr/>
+          </p:nvPicPr>
+          <p:blipFill>
+            <a:blip r:embed="rId17">
+              <a:extLst>
+                <a:ext uri="{28A0092B-C50C-407E-A947-70E740481C1C}">
+                  <a14:useLocalDpi xmlns:a14="http://schemas.microsoft.com/office/drawing/2010/main" val="0"/>
+                </a:ext>
+              </a:extLst>
+            </a:blip>
+            <a:stretch>
+              <a:fillRect/>
+            </a:stretch>
+          </p:blipFill>
+          <p:spPr>
+            <a:xfrm>
+              <a:off x="10029031" y="24867615"/>
+              <a:ext cx="1606364" cy="1606364"/>
+            </a:xfrm>
+            <a:prstGeom prst="rect">
+              <a:avLst/>
+            </a:prstGeom>
+          </p:spPr>
+        </p:pic>
+        <p:pic>
+          <p:nvPicPr>
+            <p:cNvPr id="40" name="圖片 39">
+              <a:extLst>
+                <a:ext uri="{FF2B5EF4-FFF2-40B4-BE49-F238E27FC236}">
+                  <a16:creationId xmlns:a16="http://schemas.microsoft.com/office/drawing/2014/main" id="{1C630A16-A5DB-3E1A-85CC-8845BFE58B81}"/>
+                </a:ext>
+              </a:extLst>
+            </p:cNvPr>
+            <p:cNvPicPr>
+              <a:picLocks noChangeAspect="1"/>
+            </p:cNvPicPr>
+            <p:nvPr/>
+          </p:nvPicPr>
+          <p:blipFill>
+            <a:blip r:embed="rId12">
+              <a:extLst>
+                <a:ext uri="{BEBA8EAE-BF5A-486C-A8C5-ECC9F3942E4B}">
+                  <a14:imgProps xmlns:a14="http://schemas.microsoft.com/office/drawing/2010/main">
+                    <a14:imgLayer r:embed="rId11">
+                      <a14:imgEffect>
+                        <a14:backgroundRemoval t="77524" b="95870" l="12329" r="17005"/>
+                      </a14:imgEffect>
+                    </a14:imgLayer>
+                  </a14:imgProps>
+                </a:ext>
+                <a:ext uri="{28A0092B-C50C-407E-A947-70E740481C1C}">
+                  <a14:useLocalDpi xmlns:a14="http://schemas.microsoft.com/office/drawing/2010/main" val="0"/>
+                </a:ext>
+              </a:extLst>
+            </a:blip>
+            <a:srcRect l="11744" t="75231" r="82411" b="1837"/>
+            <a:stretch/>
+          </p:blipFill>
+          <p:spPr>
+            <a:xfrm>
+              <a:off x="7789693" y="25161671"/>
+              <a:ext cx="545715" cy="994572"/>
+            </a:xfrm>
+            <a:prstGeom prst="rect">
+              <a:avLst/>
+            </a:prstGeom>
+          </p:spPr>
+        </p:pic>
+        <p:pic>
+          <p:nvPicPr>
+            <p:cNvPr id="41" name="圖片 40">
+              <a:extLst>
+                <a:ext uri="{FF2B5EF4-FFF2-40B4-BE49-F238E27FC236}">
+                  <a16:creationId xmlns:a16="http://schemas.microsoft.com/office/drawing/2014/main" id="{5B1DBD3B-4255-C2E7-37DD-33798E634C29}"/>
+                </a:ext>
+              </a:extLst>
+            </p:cNvPr>
+            <p:cNvPicPr>
+              <a:picLocks noChangeAspect="1"/>
+            </p:cNvPicPr>
+            <p:nvPr/>
+          </p:nvPicPr>
+          <p:blipFill>
+            <a:blip r:embed="rId10">
+              <a:extLst>
+                <a:ext uri="{BEBA8EAE-BF5A-486C-A8C5-ECC9F3942E4B}">
+                  <a14:imgProps xmlns:a14="http://schemas.microsoft.com/office/drawing/2010/main">
+                    <a14:imgLayer r:embed="rId11">
+                      <a14:imgEffect>
+                        <a14:backgroundRemoval t="78427" b="95754" l="2609" r="10982"/>
+                      </a14:imgEffect>
+                    </a14:imgLayer>
+                  </a14:imgProps>
+                </a:ext>
+                <a:ext uri="{28A0092B-C50C-407E-A947-70E740481C1C}">
+                  <a14:useLocalDpi xmlns:a14="http://schemas.microsoft.com/office/drawing/2010/main" val="0"/>
+                </a:ext>
+              </a:extLst>
+            </a:blip>
+            <a:srcRect l="1562" t="76261" r="87971" b="2080"/>
+            <a:stretch/>
+          </p:blipFill>
+          <p:spPr>
+            <a:xfrm>
+              <a:off x="8302116" y="25173511"/>
+              <a:ext cx="709967" cy="994572"/>
+            </a:xfrm>
+            <a:prstGeom prst="rect">
+              <a:avLst/>
+            </a:prstGeom>
+          </p:spPr>
+        </p:pic>
+        <p:pic>
+          <p:nvPicPr>
+            <p:cNvPr id="42" name="圖片 41">
+              <a:extLst>
+                <a:ext uri="{FF2B5EF4-FFF2-40B4-BE49-F238E27FC236}">
+                  <a16:creationId xmlns:a16="http://schemas.microsoft.com/office/drawing/2014/main" id="{F3207183-4132-D59A-FC90-6D1A7FB9C825}"/>
+                </a:ext>
+              </a:extLst>
+            </p:cNvPr>
+            <p:cNvPicPr>
+              <a:picLocks noChangeAspect="1"/>
+            </p:cNvPicPr>
+            <p:nvPr/>
+          </p:nvPicPr>
+          <p:blipFill>
+            <a:blip r:embed="rId10">
+              <a:extLst>
+                <a:ext uri="{BEBA8EAE-BF5A-486C-A8C5-ECC9F3942E4B}">
+                  <a14:imgProps xmlns:a14="http://schemas.microsoft.com/office/drawing/2010/main">
+                    <a14:imgLayer r:embed="rId11">
+                      <a14:imgEffect>
+                        <a14:backgroundRemoval t="78427" b="95754" l="2609" r="10982"/>
+                      </a14:imgEffect>
+                    </a14:imgLayer>
+                  </a14:imgProps>
+                </a:ext>
+                <a:ext uri="{28A0092B-C50C-407E-A947-70E740481C1C}">
+                  <a14:useLocalDpi xmlns:a14="http://schemas.microsoft.com/office/drawing/2010/main" val="0"/>
+                </a:ext>
+              </a:extLst>
+            </a:blip>
+            <a:srcRect l="1562" t="76261" r="87971" b="2080"/>
+            <a:stretch/>
+          </p:blipFill>
+          <p:spPr>
+            <a:xfrm>
+              <a:off x="8981824" y="25167556"/>
+              <a:ext cx="709967" cy="994572"/>
+            </a:xfrm>
+            <a:prstGeom prst="rect">
+              <a:avLst/>
+            </a:prstGeom>
+          </p:spPr>
+        </p:pic>
+        <p:pic>
+          <p:nvPicPr>
+            <p:cNvPr id="43" name="圖片 42">
+              <a:extLst>
+                <a:ext uri="{FF2B5EF4-FFF2-40B4-BE49-F238E27FC236}">
+                  <a16:creationId xmlns:a16="http://schemas.microsoft.com/office/drawing/2014/main" id="{8BB84F23-4FD3-7351-945F-79128F210044}"/>
+                </a:ext>
+              </a:extLst>
+            </p:cNvPr>
+            <p:cNvPicPr>
+              <a:picLocks noChangeAspect="1"/>
+            </p:cNvPicPr>
+            <p:nvPr/>
+          </p:nvPicPr>
+          <p:blipFill>
+            <a:blip r:embed="rId10">
+              <a:extLst>
+                <a:ext uri="{BEBA8EAE-BF5A-486C-A8C5-ECC9F3942E4B}">
+                  <a14:imgProps xmlns:a14="http://schemas.microsoft.com/office/drawing/2010/main">
+                    <a14:imgLayer r:embed="rId11">
+                      <a14:imgEffect>
+                        <a14:backgroundRemoval t="78427" b="95754" l="2609" r="10982"/>
+                      </a14:imgEffect>
+                    </a14:imgLayer>
+                  </a14:imgProps>
+                </a:ext>
+                <a:ext uri="{28A0092B-C50C-407E-A947-70E740481C1C}">
+                  <a14:useLocalDpi xmlns:a14="http://schemas.microsoft.com/office/drawing/2010/main" val="0"/>
+                </a:ext>
+              </a:extLst>
+            </a:blip>
+            <a:srcRect l="1562" t="76261" r="87971" b="2080"/>
+            <a:stretch/>
+          </p:blipFill>
+          <p:spPr>
+            <a:xfrm>
+              <a:off x="9667624" y="25167556"/>
+              <a:ext cx="709967" cy="994572"/>
+            </a:xfrm>
+            <a:prstGeom prst="rect">
+              <a:avLst/>
+            </a:prstGeom>
+          </p:spPr>
+        </p:pic>
+        <p:pic>
+          <p:nvPicPr>
+            <p:cNvPr id="44" name="圖片 43">
+              <a:extLst>
+                <a:ext uri="{FF2B5EF4-FFF2-40B4-BE49-F238E27FC236}">
+                  <a16:creationId xmlns:a16="http://schemas.microsoft.com/office/drawing/2014/main" id="{359E112A-3E3B-C1C8-A4A1-9379C5AF971F}"/>
+                </a:ext>
+              </a:extLst>
+            </p:cNvPr>
+            <p:cNvPicPr>
+              <a:picLocks noChangeAspect="1"/>
+            </p:cNvPicPr>
+            <p:nvPr/>
+          </p:nvPicPr>
+          <p:blipFill>
+            <a:blip r:embed="rId12">
+              <a:extLst>
+                <a:ext uri="{BEBA8EAE-BF5A-486C-A8C5-ECC9F3942E4B}">
+                  <a14:imgProps xmlns:a14="http://schemas.microsoft.com/office/drawing/2010/main">
+                    <a14:imgLayer r:embed="rId11">
+                      <a14:imgEffect>
+                        <a14:backgroundRemoval t="77524" b="95870" l="12329" r="17005"/>
+                      </a14:imgEffect>
+                    </a14:imgLayer>
+                  </a14:imgProps>
+                </a:ext>
+                <a:ext uri="{28A0092B-C50C-407E-A947-70E740481C1C}">
+                  <a14:useLocalDpi xmlns:a14="http://schemas.microsoft.com/office/drawing/2010/main" val="0"/>
+                </a:ext>
+              </a:extLst>
+            </a:blip>
+            <a:srcRect l="11744" t="75231" r="82411" b="1837"/>
+            <a:stretch/>
+          </p:blipFill>
+          <p:spPr>
+            <a:xfrm>
+              <a:off x="10121417" y="23963220"/>
+              <a:ext cx="545715" cy="1241727"/>
+            </a:xfrm>
+            <a:prstGeom prst="rect">
+              <a:avLst/>
+            </a:prstGeom>
+          </p:spPr>
+        </p:pic>
+      </p:grpSp>
+      <p:grpSp>
+        <p:nvGrpSpPr>
+          <p:cNvPr id="49" name="群組 48">
+            <a:extLst>
+              <a:ext uri="{FF2B5EF4-FFF2-40B4-BE49-F238E27FC236}">
+                <a16:creationId xmlns:a16="http://schemas.microsoft.com/office/drawing/2014/main" id="{430EB8B5-2D0A-52D3-CBFA-C21251324F64}"/>
+              </a:ext>
+            </a:extLst>
+          </p:cNvPr>
+          <p:cNvGrpSpPr/>
+          <p:nvPr/>
+        </p:nvGrpSpPr>
+        <p:grpSpPr>
+          <a:xfrm>
+            <a:off x="5279035" y="23902458"/>
+            <a:ext cx="6706326" cy="2166290"/>
+            <a:chOff x="4154714" y="23531331"/>
+            <a:chExt cx="6706326" cy="2166290"/>
+          </a:xfrm>
+        </p:grpSpPr>
+        <p:pic>
+          <p:nvPicPr>
+            <p:cNvPr id="47" name="圖片 46">
+              <a:extLst>
+                <a:ext uri="{FF2B5EF4-FFF2-40B4-BE49-F238E27FC236}">
+                  <a16:creationId xmlns:a16="http://schemas.microsoft.com/office/drawing/2014/main" id="{473CE8FD-E5D1-2685-6A0B-E3A6C77FDAEC}"/>
+                </a:ext>
+              </a:extLst>
+            </p:cNvPr>
+            <p:cNvPicPr>
+              <a:picLocks noChangeAspect="1"/>
+            </p:cNvPicPr>
+            <p:nvPr/>
+          </p:nvPicPr>
+          <p:blipFill>
+            <a:blip r:embed="rId4">
+              <a:extLst>
+                <a:ext uri="{BEBA8EAE-BF5A-486C-A8C5-ECC9F3942E4B}">
+                  <a14:imgProps xmlns:a14="http://schemas.microsoft.com/office/drawing/2010/main">
+                    <a14:imgLayer r:embed="rId5">
+                      <a14:imgEffect>
+                        <a14:backgroundRemoval t="3952" b="95533" l="2750" r="32438">
+                          <a14:foregroundMark x1="5063" y1="11512" x2="5063" y2="11512"/>
+                          <a14:foregroundMark x1="5063" y1="11512" x2="6375" y2="73883"/>
+                          <a14:foregroundMark x1="3750" y1="24570" x2="4313" y2="71478"/>
+                          <a14:foregroundMark x1="4313" y1="71478" x2="9063" y2="85395"/>
+                          <a14:foregroundMark x1="9063" y1="85395" x2="16875" y2="84021"/>
+                          <a14:foregroundMark x1="16875" y1="84021" x2="23313" y2="86254"/>
+                          <a14:foregroundMark x1="23313" y1="86254" x2="27250" y2="79553"/>
+                          <a14:foregroundMark x1="27250" y1="79553" x2="28625" y2="66838"/>
+                          <a14:foregroundMark x1="28625" y1="66838" x2="28875" y2="26804"/>
+                          <a14:foregroundMark x1="28875" y1="26804" x2="21625" y2="13746"/>
+                          <a14:foregroundMark x1="21625" y1="13746" x2="6000" y2="14777"/>
+                          <a14:foregroundMark x1="18563" y1="13058" x2="28313" y2="10653"/>
+                          <a14:foregroundMark x1="28313" y1="10653" x2="30188" y2="23540"/>
+                          <a14:foregroundMark x1="30188" y1="23540" x2="30188" y2="23540"/>
+                          <a14:foregroundMark x1="27500" y1="8763" x2="27500" y2="8763"/>
+                          <a14:foregroundMark x1="29063" y1="8247" x2="29063" y2="8247"/>
+                          <a14:foregroundMark x1="31250" y1="13746" x2="31250" y2="13746"/>
+                          <a14:foregroundMark x1="31438" y1="25773" x2="31813" y2="61340"/>
+                          <a14:foregroundMark x1="29688" y1="94158" x2="21125" y2="90550"/>
+                          <a14:foregroundMark x1="21125" y1="90550" x2="12125" y2="93471"/>
+                          <a14:foregroundMark x1="12125" y1="93471" x2="3063" y2="93471"/>
+                          <a14:foregroundMark x1="3063" y1="93471" x2="3063" y2="93471"/>
+                          <a14:foregroundMark x1="2750" y1="70103" x2="3125" y2="3952"/>
+                          <a14:foregroundMark x1="4813" y1="7045" x2="12375" y2="6873"/>
+                          <a14:foregroundMark x1="12375" y1="6873" x2="12937" y2="6873"/>
+                          <a14:foregroundMark x1="32375" y1="13746" x2="32188" y2="19416"/>
+                          <a14:foregroundMark x1="32063" y1="30756" x2="32000" y2="41581"/>
+                          <a14:foregroundMark x1="32063" y1="56529" x2="32438" y2="69072"/>
+                          <a14:foregroundMark x1="32438" y1="69072" x2="32375" y2="69244"/>
+                          <a14:foregroundMark x1="31250" y1="89347" x2="31750" y2="81271"/>
+                          <a14:foregroundMark x1="31813" y1="83505" x2="31500" y2="91065"/>
+                          <a14:foregroundMark x1="32000" y1="84880" x2="30562" y2="95533"/>
+                        </a14:backgroundRemoval>
+                      </a14:imgEffect>
+                    </a14:imgLayer>
+                  </a14:imgProps>
+                </a:ext>
+                <a:ext uri="{28A0092B-C50C-407E-A947-70E740481C1C}">
+                  <a14:useLocalDpi xmlns:a14="http://schemas.microsoft.com/office/drawing/2010/main" val="0"/>
+                </a:ext>
+              </a:extLst>
+            </a:blip>
+            <a:srcRect r="65642"/>
+            <a:stretch/>
+          </p:blipFill>
+          <p:spPr>
+            <a:xfrm>
+              <a:off x="4154714" y="23531331"/>
+              <a:ext cx="6706326" cy="2166290"/>
+            </a:xfrm>
+            <a:prstGeom prst="rect">
+              <a:avLst/>
+            </a:prstGeom>
+          </p:spPr>
+        </p:pic>
+        <p:pic>
+          <p:nvPicPr>
+            <p:cNvPr id="48" name="圖片 47">
+              <a:extLst>
+                <a:ext uri="{FF2B5EF4-FFF2-40B4-BE49-F238E27FC236}">
+                  <a16:creationId xmlns:a16="http://schemas.microsoft.com/office/drawing/2014/main" id="{2E05E62F-E65E-A96B-D29E-F2595E3C5F4D}"/>
+                </a:ext>
+              </a:extLst>
+            </p:cNvPr>
+            <p:cNvPicPr>
+              <a:picLocks noChangeAspect="1"/>
+            </p:cNvPicPr>
+            <p:nvPr/>
+          </p:nvPicPr>
+          <p:blipFill>
+            <a:blip r:embed="rId17">
+              <a:extLst>
+                <a:ext uri="{28A0092B-C50C-407E-A947-70E740481C1C}">
+                  <a14:useLocalDpi xmlns:a14="http://schemas.microsoft.com/office/drawing/2010/main" val="0"/>
+                </a:ext>
+              </a:extLst>
+            </a:blip>
+            <a:stretch>
+              <a:fillRect/>
+            </a:stretch>
+          </p:blipFill>
+          <p:spPr>
+            <a:xfrm>
+              <a:off x="5319012" y="23811294"/>
+              <a:ext cx="1606364" cy="1606364"/>
+            </a:xfrm>
+            <a:prstGeom prst="rect">
+              <a:avLst/>
+            </a:prstGeom>
+          </p:spPr>
+        </p:pic>
+      </p:grpSp>
+      <p:grpSp>
+        <p:nvGrpSpPr>
+          <p:cNvPr id="54" name="群組 53">
+            <a:extLst>
+              <a:ext uri="{FF2B5EF4-FFF2-40B4-BE49-F238E27FC236}">
+                <a16:creationId xmlns:a16="http://schemas.microsoft.com/office/drawing/2014/main" id="{07556259-A814-52C4-E1D3-2D464ABFE470}"/>
+              </a:ext>
+            </a:extLst>
+          </p:cNvPr>
+          <p:cNvGrpSpPr/>
+          <p:nvPr/>
+        </p:nvGrpSpPr>
+        <p:grpSpPr>
+          <a:xfrm>
+            <a:off x="7123432" y="5449534"/>
+            <a:ext cx="4188941" cy="4434840"/>
+            <a:chOff x="7123432" y="5449534"/>
+            <a:chExt cx="4188941" cy="4434840"/>
+          </a:xfrm>
+        </p:grpSpPr>
+        <p:pic>
+          <p:nvPicPr>
+            <p:cNvPr id="53" name="圖片 52">
+              <a:extLst>
+                <a:ext uri="{FF2B5EF4-FFF2-40B4-BE49-F238E27FC236}">
+                  <a16:creationId xmlns:a16="http://schemas.microsoft.com/office/drawing/2014/main" id="{F926D025-7BA7-9919-5000-1DE6255A26C0}"/>
+                </a:ext>
+              </a:extLst>
+            </p:cNvPr>
+            <p:cNvPicPr>
+              <a:picLocks noChangeAspect="1"/>
+            </p:cNvPicPr>
+            <p:nvPr/>
+          </p:nvPicPr>
+          <p:blipFill>
+            <a:blip r:embed="rId4">
+              <a:extLst>
+                <a:ext uri="{BEBA8EAE-BF5A-486C-A8C5-ECC9F3942E4B}">
+                  <a14:imgProps xmlns:a14="http://schemas.microsoft.com/office/drawing/2010/main">
+                    <a14:imgLayer r:embed="rId5">
+                      <a14:imgEffect>
+                        <a14:backgroundRemoval t="3952" b="95533" l="2750" r="32438">
+                          <a14:foregroundMark x1="5063" y1="11512" x2="5063" y2="11512"/>
+                          <a14:foregroundMark x1="5063" y1="11512" x2="6375" y2="73883"/>
+                          <a14:foregroundMark x1="3750" y1="24570" x2="4313" y2="71478"/>
+                          <a14:foregroundMark x1="4313" y1="71478" x2="9063" y2="85395"/>
+                          <a14:foregroundMark x1="9063" y1="85395" x2="16875" y2="84021"/>
+                          <a14:foregroundMark x1="16875" y1="84021" x2="23313" y2="86254"/>
+                          <a14:foregroundMark x1="23313" y1="86254" x2="27250" y2="79553"/>
+                          <a14:foregroundMark x1="27250" y1="79553" x2="28625" y2="66838"/>
+                          <a14:foregroundMark x1="28625" y1="66838" x2="28875" y2="26804"/>
+                          <a14:foregroundMark x1="28875" y1="26804" x2="21625" y2="13746"/>
+                          <a14:foregroundMark x1="21625" y1="13746" x2="6000" y2="14777"/>
+                          <a14:foregroundMark x1="18563" y1="13058" x2="28313" y2="10653"/>
+                          <a14:foregroundMark x1="28313" y1="10653" x2="30188" y2="23540"/>
+                          <a14:foregroundMark x1="30188" y1="23540" x2="30188" y2="23540"/>
+                          <a14:foregroundMark x1="27500" y1="8763" x2="27500" y2="8763"/>
+                          <a14:foregroundMark x1="29063" y1="8247" x2="29063" y2="8247"/>
+                          <a14:foregroundMark x1="31250" y1="13746" x2="31250" y2="13746"/>
+                          <a14:foregroundMark x1="31438" y1="25773" x2="31813" y2="61340"/>
+                          <a14:foregroundMark x1="29688" y1="94158" x2="21125" y2="90550"/>
+                          <a14:foregroundMark x1="21125" y1="90550" x2="12125" y2="93471"/>
+                          <a14:foregroundMark x1="12125" y1="93471" x2="3063" y2="93471"/>
+                          <a14:foregroundMark x1="3063" y1="93471" x2="3063" y2="93471"/>
+                          <a14:foregroundMark x1="2750" y1="70103" x2="3125" y2="3952"/>
+                          <a14:foregroundMark x1="4813" y1="7045" x2="12375" y2="6873"/>
+                          <a14:foregroundMark x1="12375" y1="6873" x2="12937" y2="6873"/>
+                          <a14:foregroundMark x1="32375" y1="13746" x2="32188" y2="19416"/>
+                          <a14:foregroundMark x1="32063" y1="30756" x2="32000" y2="41581"/>
+                          <a14:foregroundMark x1="32063" y1="56529" x2="32438" y2="69072"/>
+                          <a14:foregroundMark x1="32438" y1="69072" x2="32375" y2="69244"/>
+                          <a14:foregroundMark x1="31250" y1="89347" x2="31750" y2="81271"/>
+                          <a14:foregroundMark x1="31813" y1="83505" x2="31500" y2="91065"/>
+                          <a14:foregroundMark x1="32000" y1="84880" x2="30562" y2="95533"/>
+                        </a14:backgroundRemoval>
+                      </a14:imgEffect>
+                    </a14:imgLayer>
+                  </a14:imgProps>
+                </a:ext>
+                <a:ext uri="{28A0092B-C50C-407E-A947-70E740481C1C}">
+                  <a14:useLocalDpi xmlns:a14="http://schemas.microsoft.com/office/drawing/2010/main" val="0"/>
+                </a:ext>
+              </a:extLst>
+            </a:blip>
+            <a:srcRect r="65642"/>
+            <a:stretch/>
+          </p:blipFill>
+          <p:spPr>
+            <a:xfrm>
+              <a:off x="7123432" y="5449534"/>
+              <a:ext cx="4188941" cy="4434840"/>
+            </a:xfrm>
+            <a:prstGeom prst="rect">
+              <a:avLst/>
+            </a:prstGeom>
+          </p:spPr>
+        </p:pic>
+        <p:pic>
+          <p:nvPicPr>
+            <p:cNvPr id="51" name="圖片 50">
+              <a:extLst>
+                <a:ext uri="{FF2B5EF4-FFF2-40B4-BE49-F238E27FC236}">
+                  <a16:creationId xmlns:a16="http://schemas.microsoft.com/office/drawing/2014/main" id="{7009FA2A-9EBA-6990-55F9-05A122A517D9}"/>
+                </a:ext>
+              </a:extLst>
+            </p:cNvPr>
+            <p:cNvPicPr>
+              <a:picLocks noChangeAspect="1"/>
+            </p:cNvPicPr>
+            <p:nvPr/>
+          </p:nvPicPr>
+          <p:blipFill>
+            <a:blip r:embed="rId18">
+              <a:extLst>
+                <a:ext uri="{28A0092B-C50C-407E-A947-70E740481C1C}">
+                  <a14:useLocalDpi xmlns:a14="http://schemas.microsoft.com/office/drawing/2010/main" val="0"/>
+                </a:ext>
+              </a:extLst>
+            </a:blip>
+            <a:stretch>
+              <a:fillRect/>
+            </a:stretch>
+          </p:blipFill>
+          <p:spPr>
+            <a:xfrm>
+              <a:off x="8212502" y="6661554"/>
+              <a:ext cx="2010799" cy="2010799"/>
+            </a:xfrm>
+            <a:prstGeom prst="rect">
+              <a:avLst/>
+            </a:prstGeom>
+          </p:spPr>
+        </p:pic>
+      </p:grpSp>
     </p:spTree>
     <p:extLst>
       <p:ext uri="{BB962C8B-B14F-4D97-AF65-F5344CB8AC3E}">

</xml_diff>